<commit_message>
added PTI registry slide
</commit_message>
<xml_diff>
--- a/123/CCAMP/draft-netana-opsawg-ipfix-gpon-gem-00.pptx
+++ b/123/CCAMP/draft-netana-opsawg-ipfix-gpon-gem-00.pptx
@@ -5,15 +5,16 @@
     <p:sldMasterId id="2147483648" r:id="rId1"/>
   </p:sldMasterIdLst>
   <p:notesMasterIdLst>
-    <p:notesMasterId r:id="rId8"/>
+    <p:notesMasterId r:id="rId9"/>
   </p:notesMasterIdLst>
   <p:sldIdLst>
     <p:sldId id="1041" r:id="rId2"/>
     <p:sldId id="1053" r:id="rId3"/>
     <p:sldId id="1058" r:id="rId4"/>
-    <p:sldId id="1055" r:id="rId5"/>
-    <p:sldId id="1054" r:id="rId6"/>
-    <p:sldId id="1057" r:id="rId7"/>
+    <p:sldId id="1059" r:id="rId5"/>
+    <p:sldId id="1055" r:id="rId6"/>
+    <p:sldId id="1054" r:id="rId7"/>
+    <p:sldId id="1057" r:id="rId8"/>
   </p:sldIdLst>
   <p:sldSz cx="12192000" cy="6858000"/>
   <p:notesSz cx="6858000" cy="9144000"/>
@@ -618,7 +619,7 @@
   <pc:docChgLst>
     <pc:chgData name="Graf Thomas, INI-NET-VNC-E2E" userId="487bc3e3-9ce7-4cdd-b7b4-8899ea88d289" providerId="ADAL" clId="{C3CC97D0-28B4-4235-8780-4D920056BCD7}"/>
     <pc:docChg chg="undo redo custSel addSld delSld modSld sldOrd">
-      <pc:chgData name="Graf Thomas, INI-NET-VNC-E2E" userId="487bc3e3-9ce7-4cdd-b7b4-8899ea88d289" providerId="ADAL" clId="{C3CC97D0-28B4-4235-8780-4D920056BCD7}" dt="2025-04-08T08:44:36.414" v="2141" actId="20577"/>
+      <pc:chgData name="Graf Thomas, INI-NET-VNC-E2E" userId="487bc3e3-9ce7-4cdd-b7b4-8899ea88d289" providerId="ADAL" clId="{C3CC97D0-28B4-4235-8780-4D920056BCD7}" dt="2025-04-08T14:06:12.916" v="2319"/>
       <pc:docMkLst>
         <pc:docMk/>
       </pc:docMkLst>
@@ -1277,6 +1278,61 @@
           <pc:docMk/>
           <pc:sldMk cId="3516297288" sldId="1058"/>
         </pc:sldMkLst>
+      </pc:sldChg>
+      <pc:sldChg chg="addSp delSp modSp add mod ord">
+        <pc:chgData name="Graf Thomas, INI-NET-VNC-E2E" userId="487bc3e3-9ce7-4cdd-b7b4-8899ea88d289" providerId="ADAL" clId="{C3CC97D0-28B4-4235-8780-4D920056BCD7}" dt="2025-04-08T14:06:12.916" v="2319"/>
+        <pc:sldMkLst>
+          <pc:docMk/>
+          <pc:sldMk cId="3900353875" sldId="1059"/>
+        </pc:sldMkLst>
+        <pc:spChg chg="mod">
+          <ac:chgData name="Graf Thomas, INI-NET-VNC-E2E" userId="487bc3e3-9ce7-4cdd-b7b4-8899ea88d289" providerId="ADAL" clId="{C3CC97D0-28B4-4235-8780-4D920056BCD7}" dt="2025-04-08T14:06:04.375" v="2317" actId="20577"/>
+          <ac:spMkLst>
+            <pc:docMk/>
+            <pc:sldMk cId="3900353875" sldId="1059"/>
+            <ac:spMk id="2" creationId="{FF20F271-6F0D-4AC0-BB1D-F5C338165C13}"/>
+          </ac:spMkLst>
+        </pc:spChg>
+        <pc:spChg chg="mod">
+          <ac:chgData name="Graf Thomas, INI-NET-VNC-E2E" userId="487bc3e3-9ce7-4cdd-b7b4-8899ea88d289" providerId="ADAL" clId="{C3CC97D0-28B4-4235-8780-4D920056BCD7}" dt="2025-04-08T14:05:36.468" v="2303" actId="6549"/>
+          <ac:spMkLst>
+            <pc:docMk/>
+            <pc:sldMk cId="3900353875" sldId="1059"/>
+            <ac:spMk id="3" creationId="{29C0DFD4-432D-4B0C-93DF-790441DCF5B9}"/>
+          </ac:spMkLst>
+        </pc:spChg>
+        <pc:spChg chg="del">
+          <ac:chgData name="Graf Thomas, INI-NET-VNC-E2E" userId="487bc3e3-9ce7-4cdd-b7b4-8899ea88d289" providerId="ADAL" clId="{C3CC97D0-28B4-4235-8780-4D920056BCD7}" dt="2025-04-08T14:03:36.990" v="2149" actId="478"/>
+          <ac:spMkLst>
+            <pc:docMk/>
+            <pc:sldMk cId="3900353875" sldId="1059"/>
+            <ac:spMk id="10" creationId="{8F625ECD-D3E3-440D-B425-0B3432C16578}"/>
+          </ac:spMkLst>
+        </pc:spChg>
+        <pc:picChg chg="del">
+          <ac:chgData name="Graf Thomas, INI-NET-VNC-E2E" userId="487bc3e3-9ce7-4cdd-b7b4-8899ea88d289" providerId="ADAL" clId="{C3CC97D0-28B4-4235-8780-4D920056BCD7}" dt="2025-04-08T14:03:28.406" v="2145" actId="478"/>
+          <ac:picMkLst>
+            <pc:docMk/>
+            <pc:sldMk cId="3900353875" sldId="1059"/>
+            <ac:picMk id="5" creationId="{0A620D14-7A0F-B94B-87AD-2E98D67E3BDB}"/>
+          </ac:picMkLst>
+        </pc:picChg>
+        <pc:picChg chg="add mod">
+          <ac:chgData name="Graf Thomas, INI-NET-VNC-E2E" userId="487bc3e3-9ce7-4cdd-b7b4-8899ea88d289" providerId="ADAL" clId="{C3CC97D0-28B4-4235-8780-4D920056BCD7}" dt="2025-04-08T14:05:40.881" v="2304" actId="1076"/>
+          <ac:picMkLst>
+            <pc:docMk/>
+            <pc:sldMk cId="3900353875" sldId="1059"/>
+            <ac:picMk id="6" creationId="{6EF74B5D-8459-6F5F-F89B-F729373D8D31}"/>
+          </ac:picMkLst>
+        </pc:picChg>
+        <pc:cxnChg chg="del mod">
+          <ac:chgData name="Graf Thomas, INI-NET-VNC-E2E" userId="487bc3e3-9ce7-4cdd-b7b4-8899ea88d289" providerId="ADAL" clId="{C3CC97D0-28B4-4235-8780-4D920056BCD7}" dt="2025-04-08T14:03:38.266" v="2150" actId="478"/>
+          <ac:cxnSpMkLst>
+            <pc:docMk/>
+            <pc:sldMk cId="3900353875" sldId="1059"/>
+            <ac:cxnSpMk id="12" creationId="{3927FFDC-F759-434D-B3B9-9F996178A9F5}"/>
+          </ac:cxnSpMkLst>
+        </pc:cxnChg>
       </pc:sldChg>
     </pc:docChg>
   </pc:docChgLst>
@@ -6202,6 +6258,184 @@
         <p:spPr/>
         <p:txBody>
           <a:bodyPr>
+            <a:normAutofit/>
+          </a:bodyPr>
+          <a:lstStyle/>
+          <a:p>
+            <a:r>
+              <a:rPr lang="en-US" sz="3600" b="1" dirty="0"/>
+              <a:t>Export of GPON Encapsulation Mode in IPFIX</a:t>
+            </a:r>
+            <a:br>
+              <a:rPr lang="en-US" dirty="0"/>
+            </a:br>
+            <a:r>
+              <a:rPr lang="en-US" sz="3600" dirty="0">
+                <a:solidFill>
+                  <a:schemeClr val="bg2">
+                    <a:lumMod val="75000"/>
+                  </a:schemeClr>
+                </a:solidFill>
+              </a:rPr>
+              <a:t>ITU-T G.984.3 defines the PTI registry</a:t>
+            </a:r>
+          </a:p>
+        </p:txBody>
+      </p:sp>
+      <p:sp>
+        <p:nvSpPr>
+          <p:cNvPr id="3" name="Content Placeholder 2">
+            <a:extLst>
+              <a:ext uri="{FF2B5EF4-FFF2-40B4-BE49-F238E27FC236}">
+                <a16:creationId xmlns:a16="http://schemas.microsoft.com/office/drawing/2014/main" id="{29C0DFD4-432D-4B0C-93DF-790441DCF5B9}"/>
+              </a:ext>
+            </a:extLst>
+          </p:cNvPr>
+          <p:cNvSpPr>
+            <a:spLocks noGrp="1"/>
+          </p:cNvSpPr>
+          <p:nvPr>
+            <p:ph idx="1"/>
+          </p:nvPr>
+        </p:nvSpPr>
+        <p:spPr>
+          <a:xfrm>
+            <a:off x="838200" y="1825625"/>
+            <a:ext cx="9953445" cy="4351338"/>
+          </a:xfrm>
+        </p:spPr>
+        <p:txBody>
+          <a:bodyPr>
+            <a:noAutofit/>
+          </a:bodyPr>
+          <a:lstStyle/>
+          <a:p>
+            <a:r>
+              <a:rPr lang="en-US" sz="1700" dirty="0">
+                <a:hlinkClick r:id="rId2"/>
+              </a:rPr>
+              <a:t>ITU-T G.984.3 </a:t>
+            </a:r>
+            <a:r>
+              <a:rPr lang="en-US" sz="1700" dirty="0"/>
+              <a:t>defines in Section 8.3.1 the PTI registry with below code points. Differentiate between user and OAM resp. not the end and end of the frame.</a:t>
+            </a:r>
+          </a:p>
+        </p:txBody>
+      </p:sp>
+      <p:sp>
+        <p:nvSpPr>
+          <p:cNvPr id="16" name="Slide Number Placeholder 1">
+            <a:extLst>
+              <a:ext uri="{FF2B5EF4-FFF2-40B4-BE49-F238E27FC236}">
+                <a16:creationId xmlns:a16="http://schemas.microsoft.com/office/drawing/2014/main" id="{4D0044F8-1C12-4A59-883A-7B56B9370029}"/>
+              </a:ext>
+            </a:extLst>
+          </p:cNvPr>
+          <p:cNvSpPr>
+            <a:spLocks noGrp="1"/>
+          </p:cNvSpPr>
+          <p:nvPr>
+            <p:ph type="sldNum" sz="quarter" idx="12"/>
+          </p:nvPr>
+        </p:nvSpPr>
+        <p:spPr>
+          <a:xfrm>
+            <a:off x="11607800" y="6362700"/>
+            <a:ext cx="414338" cy="365125"/>
+          </a:xfrm>
+        </p:spPr>
+        <p:txBody>
+          <a:bodyPr/>
+          <a:lstStyle/>
+          <a:p>
+            <a:fld id="{FC4AC485-25DE-431E-B345-9C0A15BB7F8A}" type="slidenum">
+              <a:rPr lang="en-US" sz="2200" smtClean="0"/>
+              <a:t>4</a:t>
+            </a:fld>
+            <a:endParaRPr lang="en-US" sz="2200"/>
+          </a:p>
+        </p:txBody>
+      </p:sp>
+      <p:pic>
+        <p:nvPicPr>
+          <p:cNvPr id="6" name="Picture 5">
+            <a:extLst>
+              <a:ext uri="{FF2B5EF4-FFF2-40B4-BE49-F238E27FC236}">
+                <a16:creationId xmlns:a16="http://schemas.microsoft.com/office/drawing/2014/main" id="{6EF74B5D-8459-6F5F-F89B-F729373D8D31}"/>
+              </a:ext>
+            </a:extLst>
+          </p:cNvPr>
+          <p:cNvPicPr>
+            <a:picLocks noChangeAspect="1"/>
+          </p:cNvPicPr>
+          <p:nvPr/>
+        </p:nvPicPr>
+        <p:blipFill>
+          <a:blip r:embed="rId3"/>
+          <a:stretch>
+            <a:fillRect/>
+          </a:stretch>
+        </p:blipFill>
+        <p:spPr>
+          <a:xfrm>
+            <a:off x="838200" y="2613716"/>
+            <a:ext cx="8049748" cy="2991267"/>
+          </a:xfrm>
+          <a:prstGeom prst="rect">
+            <a:avLst/>
+          </a:prstGeom>
+        </p:spPr>
+      </p:pic>
+    </p:spTree>
+    <p:extLst>
+      <p:ext uri="{BB962C8B-B14F-4D97-AF65-F5344CB8AC3E}">
+        <p14:creationId xmlns:p14="http://schemas.microsoft.com/office/powerpoint/2010/main" val="3900353875"/>
+      </p:ext>
+    </p:extLst>
+  </p:cSld>
+  <p:clrMapOvr>
+    <a:masterClrMapping/>
+  </p:clrMapOvr>
+</p:sld>
+</file>
+
+<file path=ppt/slides/slide5.xml><?xml version="1.0" encoding="utf-8"?>
+<p:sld xmlns:a="http://schemas.openxmlformats.org/drawingml/2006/main" xmlns:r="http://schemas.openxmlformats.org/officeDocument/2006/relationships" xmlns:p="http://schemas.openxmlformats.org/presentationml/2006/main">
+  <p:cSld>
+    <p:spTree>
+      <p:nvGrpSpPr>
+        <p:cNvPr id="1" name=""/>
+        <p:cNvGrpSpPr/>
+        <p:nvPr/>
+      </p:nvGrpSpPr>
+      <p:grpSpPr>
+        <a:xfrm>
+          <a:off x="0" y="0"/>
+          <a:ext cx="0" cy="0"/>
+          <a:chOff x="0" y="0"/>
+          <a:chExt cx="0" cy="0"/>
+        </a:xfrm>
+      </p:grpSpPr>
+      <p:sp>
+        <p:nvSpPr>
+          <p:cNvPr id="2" name="Title 1">
+            <a:extLst>
+              <a:ext uri="{FF2B5EF4-FFF2-40B4-BE49-F238E27FC236}">
+                <a16:creationId xmlns:a16="http://schemas.microsoft.com/office/drawing/2014/main" id="{FF20F271-6F0D-4AC0-BB1D-F5C338165C13}"/>
+              </a:ext>
+            </a:extLst>
+          </p:cNvPr>
+          <p:cNvSpPr>
+            <a:spLocks noGrp="1"/>
+          </p:cNvSpPr>
+          <p:nvPr>
+            <p:ph type="title"/>
+          </p:nvPr>
+        </p:nvSpPr>
+        <p:spPr/>
+        <p:txBody>
+          <a:bodyPr>
             <a:normAutofit fontScale="90000"/>
           </a:bodyPr>
           <a:lstStyle/>
@@ -6622,7 +6856,7 @@
           <a:p>
             <a:fld id="{FC4AC485-25DE-431E-B345-9C0A15BB7F8A}" type="slidenum">
               <a:rPr lang="en-US" sz="2200" smtClean="0"/>
-              <a:t>4</a:t>
+              <a:t>5</a:t>
             </a:fld>
             <a:endParaRPr lang="en-US" sz="2200" dirty="0"/>
           </a:p>
@@ -6671,7 +6905,7 @@
 </p:sld>
 </file>
 
-<file path=ppt/slides/slide5.xml><?xml version="1.0" encoding="utf-8"?>
+<file path=ppt/slides/slide6.xml><?xml version="1.0" encoding="utf-8"?>
 <p:sld xmlns:a="http://schemas.openxmlformats.org/drawingml/2006/main" xmlns:r="http://schemas.openxmlformats.org/officeDocument/2006/relationships" xmlns:p="http://schemas.openxmlformats.org/presentationml/2006/main">
   <p:cSld>
     <p:spTree>
@@ -6927,7 +7161,7 @@
           <a:p>
             <a:fld id="{FC4AC485-25DE-431E-B345-9C0A15BB7F8A}" type="slidenum">
               <a:rPr lang="en-US" sz="2200" smtClean="0"/>
-              <a:t>5</a:t>
+              <a:t>6</a:t>
             </a:fld>
             <a:endParaRPr lang="en-US" sz="2200"/>
           </a:p>
@@ -8114,7 +8348,7 @@
 </p:sld>
 </file>
 
-<file path=ppt/slides/slide6.xml><?xml version="1.0" encoding="utf-8"?>
+<file path=ppt/slides/slide7.xml><?xml version="1.0" encoding="utf-8"?>
 <p:sld xmlns:a="http://schemas.openxmlformats.org/drawingml/2006/main" xmlns:r="http://schemas.openxmlformats.org/officeDocument/2006/relationships" xmlns:p="http://schemas.openxmlformats.org/presentationml/2006/main">
   <p:cSld>
     <p:spTree>
@@ -8259,7 +8493,7 @@
           <a:p>
             <a:fld id="{FC4AC485-25DE-431E-B345-9C0A15BB7F8A}" type="slidenum">
               <a:rPr lang="en-US" sz="2200" smtClean="0"/>
-              <a:t>6</a:t>
+              <a:t>7</a:t>
             </a:fld>
             <a:endParaRPr lang="en-US" sz="2200" dirty="0"/>
           </a:p>

</xml_diff>

<commit_message>
small nit in slide 3
</commit_message>
<xml_diff>
--- a/123/CCAMP/draft-netana-opsawg-ipfix-gpon-gem-00.pptx
+++ b/123/CCAMP/draft-netana-opsawg-ipfix-gpon-gem-00.pptx
@@ -619,7 +619,7 @@
   <pc:docChgLst>
     <pc:chgData name="Graf Thomas, INI-NET-VNC-E2E" userId="487bc3e3-9ce7-4cdd-b7b4-8899ea88d289" providerId="ADAL" clId="{C3CC97D0-28B4-4235-8780-4D920056BCD7}"/>
     <pc:docChg chg="undo redo custSel addSld delSld modSld sldOrd">
-      <pc:chgData name="Graf Thomas, INI-NET-VNC-E2E" userId="487bc3e3-9ce7-4cdd-b7b4-8899ea88d289" providerId="ADAL" clId="{C3CC97D0-28B4-4235-8780-4D920056BCD7}" dt="2025-04-08T14:06:12.916" v="2319"/>
+      <pc:chgData name="Graf Thomas, INI-NET-VNC-E2E" userId="487bc3e3-9ce7-4cdd-b7b4-8899ea88d289" providerId="ADAL" clId="{C3CC97D0-28B4-4235-8780-4D920056BCD7}" dt="2025-04-08T14:32:24.506" v="2502" actId="33524"/>
       <pc:docMkLst>
         <pc:docMk/>
       </pc:docMkLst>
@@ -1218,7 +1218,7 @@
         </pc:spChg>
       </pc:sldChg>
       <pc:sldChg chg="addSp delSp modSp add mod">
-        <pc:chgData name="Graf Thomas, INI-NET-VNC-E2E" userId="487bc3e3-9ce7-4cdd-b7b4-8899ea88d289" providerId="ADAL" clId="{C3CC97D0-28B4-4235-8780-4D920056BCD7}" dt="2025-04-08T08:44:36.414" v="2141" actId="20577"/>
+        <pc:chgData name="Graf Thomas, INI-NET-VNC-E2E" userId="487bc3e3-9ce7-4cdd-b7b4-8899ea88d289" providerId="ADAL" clId="{C3CC97D0-28B4-4235-8780-4D920056BCD7}" dt="2025-04-08T14:32:24.506" v="2502" actId="33524"/>
         <pc:sldMkLst>
           <pc:docMk/>
           <pc:sldMk cId="1587469533" sldId="1058"/>
@@ -1232,7 +1232,7 @@
           </ac:spMkLst>
         </pc:spChg>
         <pc:spChg chg="mod">
-          <ac:chgData name="Graf Thomas, INI-NET-VNC-E2E" userId="487bc3e3-9ce7-4cdd-b7b4-8899ea88d289" providerId="ADAL" clId="{C3CC97D0-28B4-4235-8780-4D920056BCD7}" dt="2025-04-08T08:44:36.414" v="2141" actId="20577"/>
+          <ac:chgData name="Graf Thomas, INI-NET-VNC-E2E" userId="487bc3e3-9ce7-4cdd-b7b4-8899ea88d289" providerId="ADAL" clId="{C3CC97D0-28B4-4235-8780-4D920056BCD7}" dt="2025-04-08T14:32:24.506" v="2502" actId="33524"/>
           <ac:spMkLst>
             <pc:docMk/>
             <pc:sldMk cId="1587469533" sldId="1058"/>
@@ -6074,7 +6074,7 @@
           <a:p>
             <a:r>
               <a:rPr lang="en-US" sz="1700" dirty="0"/>
-              <a:t>PLI and HEC are </a:t>
+              <a:t>Payload length indicator (PLI) and header error control (HEC) are for tracing and debugging purposes interesting but not relevant for accounting. Therefore, excluded from IPFIX. </a:t>
             </a:r>
           </a:p>
         </p:txBody>

</xml_diff>